<commit_message>
Reference to Google Code hosting in Wrapup.pptx
</commit_message>
<xml_diff>
--- a/Wrapup.pptx
+++ b/Wrapup.pptx
@@ -195,7 +195,7 @@
           <a:p>
             <a:fld id="{B3E85FA4-0BF1-4624-B558-8D6F7C4705DF}" type="datetimeFigureOut">
               <a:rPr lang="en-US" smtClean="0"/>
-              <a:t>8/30/2011</a:t>
+              <a:t>5/10/2013</a:t>
             </a:fld>
             <a:endParaRPr lang="en-US"/>
           </a:p>
@@ -1011,7 +1011,7 @@
           <a:p>
             <a:fld id="{0E2A55ED-DD07-4463-BF52-CBAFC7E1266F}" type="datetimeFigureOut">
               <a:rPr lang="en-US" smtClean="0"/>
-              <a:t>8/30/2011</a:t>
+              <a:t>5/10/2013</a:t>
             </a:fld>
             <a:endParaRPr lang="en-US"/>
           </a:p>
@@ -1183,7 +1183,7 @@
           <a:p>
             <a:fld id="{0E2A55ED-DD07-4463-BF52-CBAFC7E1266F}" type="datetimeFigureOut">
               <a:rPr lang="en-US" smtClean="0"/>
-              <a:t>8/30/2011</a:t>
+              <a:t>5/10/2013</a:t>
             </a:fld>
             <a:endParaRPr lang="en-US"/>
           </a:p>
@@ -1365,7 +1365,7 @@
           <a:p>
             <a:fld id="{0E2A55ED-DD07-4463-BF52-CBAFC7E1266F}" type="datetimeFigureOut">
               <a:rPr lang="en-US" smtClean="0"/>
-              <a:t>8/30/2011</a:t>
+              <a:t>5/10/2013</a:t>
             </a:fld>
             <a:endParaRPr lang="en-US"/>
           </a:p>
@@ -1537,7 +1537,7 @@
           <a:p>
             <a:fld id="{0E2A55ED-DD07-4463-BF52-CBAFC7E1266F}" type="datetimeFigureOut">
               <a:rPr lang="en-US" smtClean="0"/>
-              <a:t>8/30/2011</a:t>
+              <a:t>5/10/2013</a:t>
             </a:fld>
             <a:endParaRPr lang="en-US"/>
           </a:p>
@@ -1661,7 +1661,7 @@
           <a:p>
             <a:fld id="{0E2A55ED-DD07-4463-BF52-CBAFC7E1266F}" type="datetimeFigureOut">
               <a:rPr lang="en-US" smtClean="0"/>
-              <a:t>8/30/2011</a:t>
+              <a:t>5/10/2013</a:t>
             </a:fld>
             <a:endParaRPr lang="en-US"/>
           </a:p>
@@ -1940,7 +1940,7 @@
           <a:p>
             <a:fld id="{0E2A55ED-DD07-4463-BF52-CBAFC7E1266F}" type="datetimeFigureOut">
               <a:rPr lang="en-US" smtClean="0"/>
-              <a:t>8/30/2011</a:t>
+              <a:t>5/10/2013</a:t>
             </a:fld>
             <a:endParaRPr lang="en-US"/>
           </a:p>
@@ -2209,7 +2209,7 @@
           <a:p>
             <a:fld id="{0E2A55ED-DD07-4463-BF52-CBAFC7E1266F}" type="datetimeFigureOut">
               <a:rPr lang="en-US" smtClean="0"/>
-              <a:t>8/30/2011</a:t>
+              <a:t>5/10/2013</a:t>
             </a:fld>
             <a:endParaRPr lang="en-US"/>
           </a:p>
@@ -2663,7 +2663,7 @@
           <a:p>
             <a:fld id="{0E2A55ED-DD07-4463-BF52-CBAFC7E1266F}" type="datetimeFigureOut">
               <a:rPr lang="en-US" smtClean="0"/>
-              <a:t>8/30/2011</a:t>
+              <a:t>5/10/2013</a:t>
             </a:fld>
             <a:endParaRPr lang="en-US"/>
           </a:p>
@@ -2783,7 +2783,7 @@
           <a:p>
             <a:fld id="{0E2A55ED-DD07-4463-BF52-CBAFC7E1266F}" type="datetimeFigureOut">
               <a:rPr lang="en-US" smtClean="0"/>
-              <a:t>8/30/2011</a:t>
+              <a:t>5/10/2013</a:t>
             </a:fld>
             <a:endParaRPr lang="en-US"/>
           </a:p>
@@ -3040,7 +3040,7 @@
           <a:p>
             <a:fld id="{0E2A55ED-DD07-4463-BF52-CBAFC7E1266F}" type="datetimeFigureOut">
               <a:rPr lang="en-US" smtClean="0"/>
-              <a:t>8/30/2011</a:t>
+              <a:t>5/10/2013</a:t>
             </a:fld>
             <a:endParaRPr lang="en-US"/>
           </a:p>
@@ -3287,7 +3287,7 @@
           <a:p>
             <a:fld id="{0E2A55ED-DD07-4463-BF52-CBAFC7E1266F}" type="datetimeFigureOut">
               <a:rPr lang="en-US" smtClean="0"/>
-              <a:t>8/30/2011</a:t>
+              <a:t>5/10/2013</a:t>
             </a:fld>
             <a:endParaRPr lang="en-US"/>
           </a:p>
@@ -3467,7 +3467,7 @@
           <a:p>
             <a:fld id="{0E2A55ED-DD07-4463-BF52-CBAFC7E1266F}" type="datetimeFigureOut">
               <a:rPr lang="en-US" smtClean="0"/>
-              <a:t>8/30/2011</a:t>
+              <a:t>5/10/2013</a:t>
             </a:fld>
             <a:endParaRPr lang="en-US"/>
           </a:p>
@@ -4231,9 +4231,28 @@
           <a:p>
             <a:r>
               <a:rPr lang="en-US" dirty="0" smtClean="0"/>
-              <a:t>“Get More Help” document</a:t>
-            </a:r>
-            <a:endParaRPr lang="en-US" dirty="0"/>
+              <a:t>“Get More Help” </a:t>
+            </a:r>
+            <a:r>
+              <a:rPr lang="en-US" dirty="0" smtClean="0"/>
+              <a:t>document</a:t>
+            </a:r>
+          </a:p>
+          <a:p>
+            <a:r>
+              <a:rPr lang="en-US" dirty="0" smtClean="0"/>
+              <a:t>Workshop Materials:</a:t>
+            </a:r>
+          </a:p>
+          <a:p>
+            <a:pPr marL="0" indent="0">
+              <a:buNone/>
+            </a:pPr>
+            <a:r>
+              <a:rPr lang="en-US" sz="3200" b="1" dirty="0"/>
+              <a:t>http://code.google.com/p/mmdmapsdev/</a:t>
+            </a:r>
+            <a:endParaRPr lang="en-US" b="1" dirty="0"/>
           </a:p>
         </p:txBody>
       </p:sp>

</xml_diff>